<commit_message>
Doc: integrated linkchecker into gen_doc, plus style alignments.
</commit_message>
<xml_diff>
--- a/Documentation/Doxygen/src/images/EventRecorder.pptx
+++ b/Documentation/Doxygen/src/images/EventRecorder.pptx
@@ -267,7 +267,7 @@
             <a:fld id="{E72D30EF-8F20-0B47-8B5D-39A8BC29E860}" type="datetimeFigureOut">
               <a:rPr lang="en-US" smtClean="0"/>
               <a:pPr/>
-              <a:t>10/24/2023</a:t>
+              <a:t>11/9/2023</a:t>
             </a:fld>
             <a:endParaRPr lang="en-US"/>
           </a:p>
@@ -435,7 +435,7 @@
             <a:fld id="{77EDD36E-1E02-F241-9611-1F1D9EAAD326}" type="datetimeFigureOut">
               <a:rPr lang="en-US" smtClean="0"/>
               <a:pPr/>
-              <a:t>10/24/2023</a:t>
+              <a:t>11/9/2023</a:t>
             </a:fld>
             <a:endParaRPr lang="en-US"/>
           </a:p>
@@ -20567,31 +20567,6 @@
           </a:p>
         </p:txBody>
       </p:sp>
-      <p:sp>
-        <p:nvSpPr>
-          <p:cNvPr id="3" name="Content Placeholder 2">
-            <a:extLst>
-              <a:ext uri="{FF2B5EF4-FFF2-40B4-BE49-F238E27FC236}">
-                <a16:creationId xmlns:a16="http://schemas.microsoft.com/office/drawing/2014/main" id="{0D3651E7-48FA-4B9F-BE3C-FAA0E8531C76}"/>
-              </a:ext>
-            </a:extLst>
-          </p:cNvPr>
-          <p:cNvSpPr>
-            <a:spLocks noGrp="1"/>
-          </p:cNvSpPr>
-          <p:nvPr>
-            <p:ph idx="1"/>
-          </p:nvPr>
-        </p:nvSpPr>
-        <p:spPr/>
-        <p:txBody>
-          <a:bodyPr/>
-          <a:lstStyle/>
-          <a:p>
-            <a:endParaRPr lang="en-US" dirty="0"/>
-          </a:p>
-        </p:txBody>
-      </p:sp>
       <p:pic>
         <p:nvPicPr>
           <p:cNvPr id="20" name="Picture 2">
@@ -21424,31 +21399,6 @@
           </a:p>
         </p:txBody>
       </p:sp>
-      <p:sp>
-        <p:nvSpPr>
-          <p:cNvPr id="3" name="Content Placeholder 2">
-            <a:extLst>
-              <a:ext uri="{FF2B5EF4-FFF2-40B4-BE49-F238E27FC236}">
-                <a16:creationId xmlns:a16="http://schemas.microsoft.com/office/drawing/2014/main" id="{76DD85CE-A48C-4186-BB43-DA478B0E4529}"/>
-              </a:ext>
-            </a:extLst>
-          </p:cNvPr>
-          <p:cNvSpPr>
-            <a:spLocks noGrp="1"/>
-          </p:cNvSpPr>
-          <p:nvPr>
-            <p:ph idx="1"/>
-          </p:nvPr>
-        </p:nvSpPr>
-        <p:spPr/>
-        <p:txBody>
-          <a:bodyPr/>
-          <a:lstStyle/>
-          <a:p>
-            <a:endParaRPr lang="en-US" dirty="0"/>
-          </a:p>
-        </p:txBody>
-      </p:sp>
       <p:pic>
         <p:nvPicPr>
           <p:cNvPr id="4" name="Picture 2">
@@ -22006,31 +21956,6 @@
           </a:p>
         </p:txBody>
       </p:sp>
-      <p:sp>
-        <p:nvSpPr>
-          <p:cNvPr id="3" name="Content Placeholder 2">
-            <a:extLst>
-              <a:ext uri="{FF2B5EF4-FFF2-40B4-BE49-F238E27FC236}">
-                <a16:creationId xmlns:a16="http://schemas.microsoft.com/office/drawing/2014/main" id="{EA89EBE5-7E1C-4ED6-8993-0150FECAA9A1}"/>
-              </a:ext>
-            </a:extLst>
-          </p:cNvPr>
-          <p:cNvSpPr>
-            <a:spLocks noGrp="1"/>
-          </p:cNvSpPr>
-          <p:nvPr>
-            <p:ph idx="1"/>
-          </p:nvPr>
-        </p:nvSpPr>
-        <p:spPr/>
-        <p:txBody>
-          <a:bodyPr/>
-          <a:lstStyle/>
-          <a:p>
-            <a:endParaRPr lang="en-US" dirty="0"/>
-          </a:p>
-        </p:txBody>
-      </p:sp>
       <p:pic>
         <p:nvPicPr>
           <p:cNvPr id="4" name="Picture 2">
@@ -22210,27 +22135,7 @@
                 <a:latin typeface="Courier New" panose="02070309020205020404" pitchFamily="49" charset="0"/>
                 <a:cs typeface="Courier New" panose="02070309020205020404" pitchFamily="49" charset="0"/>
               </a:rPr>
-              <a:t>  </a:t>
-            </a:r>
-            <a:r>
-              <a:rPr lang="en-US" sz="1200" b="1" kern="0" dirty="0" err="1">
-                <a:solidFill>
-                  <a:prstClr val="white"/>
-                </a:solidFill>
-                <a:latin typeface="Courier New" panose="02070309020205020404" pitchFamily="49" charset="0"/>
-                <a:cs typeface="Courier New" panose="02070309020205020404" pitchFamily="49" charset="0"/>
-              </a:rPr>
-              <a:t>EventStartA</a:t>
-            </a:r>
-            <a:r>
-              <a:rPr lang="en-US" sz="1200" b="1" kern="0" dirty="0">
-                <a:solidFill>
-                  <a:prstClr val="white"/>
-                </a:solidFill>
-                <a:latin typeface="Courier New" panose="02070309020205020404" pitchFamily="49" charset="0"/>
-                <a:cs typeface="Courier New" panose="02070309020205020404" pitchFamily="49" charset="0"/>
-              </a:rPr>
-              <a:t>(0);</a:t>
+              <a:t>  EventStartA(0);</a:t>
             </a:r>
           </a:p>
           <a:p>
@@ -22256,27 +22161,7 @@
                 <a:latin typeface="Courier New" panose="02070309020205020404" pitchFamily="49" charset="0"/>
                 <a:cs typeface="Courier New" panose="02070309020205020404" pitchFamily="49" charset="0"/>
               </a:rPr>
-              <a:t>  </a:t>
-            </a:r>
-            <a:r>
-              <a:rPr lang="en-US" sz="1200" b="1" kern="0" dirty="0" err="1">
-                <a:solidFill>
-                  <a:prstClr val="white"/>
-                </a:solidFill>
-                <a:latin typeface="Courier New" panose="02070309020205020404" pitchFamily="49" charset="0"/>
-                <a:cs typeface="Courier New" panose="02070309020205020404" pitchFamily="49" charset="0"/>
-              </a:rPr>
-              <a:t>EventStopA</a:t>
-            </a:r>
-            <a:r>
-              <a:rPr lang="en-US" sz="1200" b="1" kern="0" dirty="0">
-                <a:solidFill>
-                  <a:prstClr val="white"/>
-                </a:solidFill>
-                <a:latin typeface="Courier New" panose="02070309020205020404" pitchFamily="49" charset="0"/>
-                <a:cs typeface="Courier New" panose="02070309020205020404" pitchFamily="49" charset="0"/>
-              </a:rPr>
-              <a:t>(0);</a:t>
+              <a:t>  EventStopA(0);</a:t>
             </a:r>
           </a:p>
           <a:p>
@@ -22302,27 +22187,7 @@
                 <a:latin typeface="Courier New" panose="02070309020205020404" pitchFamily="49" charset="0"/>
                 <a:cs typeface="Courier New" panose="02070309020205020404" pitchFamily="49" charset="0"/>
               </a:rPr>
-              <a:t>  </a:t>
-            </a:r>
-            <a:r>
-              <a:rPr lang="en-US" sz="1200" b="1" kern="0" dirty="0" err="1">
-                <a:solidFill>
-                  <a:prstClr val="white"/>
-                </a:solidFill>
-                <a:latin typeface="Courier New" panose="02070309020205020404" pitchFamily="49" charset="0"/>
-                <a:cs typeface="Courier New" panose="02070309020205020404" pitchFamily="49" charset="0"/>
-              </a:rPr>
-              <a:t>EventStartB</a:t>
-            </a:r>
-            <a:r>
-              <a:rPr lang="en-US" sz="1200" b="1" kern="0" dirty="0">
-                <a:solidFill>
-                  <a:prstClr val="white"/>
-                </a:solidFill>
-                <a:latin typeface="Courier New" panose="02070309020205020404" pitchFamily="49" charset="0"/>
-                <a:cs typeface="Courier New" panose="02070309020205020404" pitchFamily="49" charset="0"/>
-              </a:rPr>
-              <a:t>(0);</a:t>
+              <a:t>  EventStartB(0);</a:t>
             </a:r>
           </a:p>
           <a:p>
@@ -22348,27 +22213,7 @@
                 <a:latin typeface="Courier New" panose="02070309020205020404" pitchFamily="49" charset="0"/>
                 <a:cs typeface="Courier New" panose="02070309020205020404" pitchFamily="49" charset="0"/>
               </a:rPr>
-              <a:t>  </a:t>
-            </a:r>
-            <a:r>
-              <a:rPr lang="en-US" sz="1200" b="1" kern="0" dirty="0" err="1">
-                <a:solidFill>
-                  <a:prstClr val="white"/>
-                </a:solidFill>
-                <a:latin typeface="Courier New" panose="02070309020205020404" pitchFamily="49" charset="0"/>
-                <a:cs typeface="Courier New" panose="02070309020205020404" pitchFamily="49" charset="0"/>
-              </a:rPr>
-              <a:t>EventStopB</a:t>
-            </a:r>
-            <a:r>
-              <a:rPr lang="en-US" sz="1200" b="1" kern="0" dirty="0">
-                <a:solidFill>
-                  <a:prstClr val="white"/>
-                </a:solidFill>
-                <a:latin typeface="Courier New" panose="02070309020205020404" pitchFamily="49" charset="0"/>
-                <a:cs typeface="Courier New" panose="02070309020205020404" pitchFamily="49" charset="0"/>
-              </a:rPr>
-              <a:t>(0);</a:t>
+              <a:t>  EventStopB(0);</a:t>
             </a:r>
           </a:p>
           <a:p>
@@ -22590,31 +22435,6 @@
               <a:rPr lang="en-US" dirty="0"/>
               <a:t>Event Statistics with energy measurement</a:t>
             </a:r>
-          </a:p>
-        </p:txBody>
-      </p:sp>
-      <p:sp>
-        <p:nvSpPr>
-          <p:cNvPr id="3" name="Content Placeholder 2">
-            <a:extLst>
-              <a:ext uri="{FF2B5EF4-FFF2-40B4-BE49-F238E27FC236}">
-                <a16:creationId xmlns:a16="http://schemas.microsoft.com/office/drawing/2014/main" id="{EA89EBE5-7E1C-4ED6-8993-0150FECAA9A1}"/>
-              </a:ext>
-            </a:extLst>
-          </p:cNvPr>
-          <p:cNvSpPr>
-            <a:spLocks noGrp="1"/>
-          </p:cNvSpPr>
-          <p:nvPr>
-            <p:ph idx="1"/>
-          </p:nvPr>
-        </p:nvSpPr>
-        <p:spPr/>
-        <p:txBody>
-          <a:bodyPr/>
-          <a:lstStyle/>
-          <a:p>
-            <a:endParaRPr lang="en-US" dirty="0"/>
           </a:p>
         </p:txBody>
       </p:sp>
@@ -27596,23 +27416,68 @@
 
 <file path=customXml/item1.xml><?xml version="1.0" encoding="utf-8"?>
 <?mso-contentType ?>
-<FormTemplates xmlns="http://schemas.microsoft.com/sharepoint/v3/contenttype/forms">
-  <Display>DocumentLibraryForm</Display>
-  <Edit>DocumentLibraryForm</Edit>
-  <New>DocumentLibraryForm</New>
-</FormTemplates>
+<spe:Receivers xmlns:spe="http://schemas.microsoft.com/sharepoint/events">
+  <Receiver>
+    <Name>Document ID Generator</Name>
+    <Synchronization>Synchronous</Synchronization>
+    <Type>10001</Type>
+    <SequenceNumber>1000</SequenceNumber>
+    <Assembly>Microsoft.Office.DocumentManagement, Version=14.0.0.0, Culture=neutral, PublicKeyToken=71e9bce111e9429c</Assembly>
+    <Class>Microsoft.Office.DocumentManagement.Internal.DocIdHandler</Class>
+    <Data/>
+    <Filter/>
+  </Receiver>
+  <Receiver>
+    <Name>Document ID Generator</Name>
+    <Synchronization>Synchronous</Synchronization>
+    <Type>10002</Type>
+    <SequenceNumber>1001</SequenceNumber>
+    <Assembly>Microsoft.Office.DocumentManagement, Version=14.0.0.0, Culture=neutral, PublicKeyToken=71e9bce111e9429c</Assembly>
+    <Class>Microsoft.Office.DocumentManagement.Internal.DocIdHandler</Class>
+    <Data/>
+    <Filter/>
+  </Receiver>
+  <Receiver>
+    <Name>Document ID Generator</Name>
+    <Synchronization>Synchronous</Synchronization>
+    <Type>10004</Type>
+    <SequenceNumber>1002</SequenceNumber>
+    <Assembly>Microsoft.Office.DocumentManagement, Version=14.0.0.0, Culture=neutral, PublicKeyToken=71e9bce111e9429c</Assembly>
+    <Class>Microsoft.Office.DocumentManagement.Internal.DocIdHandler</Class>
+    <Data/>
+    <Filter/>
+  </Receiver>
+  <Receiver>
+    <Name>Document ID Generator</Name>
+    <Synchronization>Synchronous</Synchronization>
+    <Type>10006</Type>
+    <SequenceNumber>1003</SequenceNumber>
+    <Assembly>Microsoft.Office.DocumentManagement, Version=14.0.0.0, Culture=neutral, PublicKeyToken=71e9bce111e9429c</Assembly>
+    <Class>Microsoft.Office.DocumentManagement.Internal.DocIdHandler</Class>
+    <Data/>
+    <Filter/>
+  </Receiver>
+</spe:Receivers>
 </file>
 
 <file path=customXml/item2.xml><?xml version="1.0" encoding="utf-8"?>
-<p:properties xmlns:p="http://schemas.microsoft.com/office/2006/metadata/properties" xmlns:xsi="http://www.w3.org/2001/XMLSchema-instance">
-  <documentManagement>
-    <_dlc_DocId xmlns="f2ad5090-61a8-4b8c-ab70-68f4ff4d1933">ARM-ECM-0559802</_dlc_DocId>
-    <_dlc_DocIdUrl xmlns="f2ad5090-61a8-4b8c-ab70-68f4ff4d1933">
-      <Url>http://teamsites.arm.com/sites/commops/_layouts/DocIdRedir.aspx?ID=ARM-ECM-0559802</Url>
-      <Description>ARM-ECM-0559802</Description>
-    </_dlc_DocIdUrl>
-  </documentManagement>
-</p:properties>
+<?mso-contentType ?>
+<p:Policy xmlns:p="office.server.policy" id="" local="true">
+  <p:Name>Document</p:Name>
+  <p:Description/>
+  <p:Statement/>
+  <p:PolicyItems>
+    <p:PolicyItem featureId="Microsoft.Office.RecordsManagement.PolicyFeatures.PolicyAudit" staticId="0x0101003596DE54BEBB26489934FE71AEF742B7|937198175" UniqueId="1e4c585b-7e46-4aa8-8487-786b980c56ea">
+      <p:Name>Auditing</p:Name>
+      <p:Description>Audits user actions on documents and list items to the Audit Log.</p:Description>
+      <p:CustomData>
+        <Audit>
+          <View/>
+        </Audit>
+      </p:CustomData>
+    </p:PolicyItem>
+  </p:PolicyItems>
+</p:Policy>
 </file>
 
 <file path=customXml/item3.xml><?xml version="1.0" encoding="utf-8"?>
@@ -27772,92 +27637,38 @@
 </file>
 
 <file path=customXml/item4.xml><?xml version="1.0" encoding="utf-8"?>
-<?mso-contentType ?>
-<p:Policy xmlns:p="office.server.policy" id="" local="true">
-  <p:Name>Document</p:Name>
-  <p:Description/>
-  <p:Statement/>
-  <p:PolicyItems>
-    <p:PolicyItem featureId="Microsoft.Office.RecordsManagement.PolicyFeatures.PolicyAudit" staticId="0x0101003596DE54BEBB26489934FE71AEF742B7|937198175" UniqueId="1e4c585b-7e46-4aa8-8487-786b980c56ea">
-      <p:Name>Auditing</p:Name>
-      <p:Description>Audits user actions on documents and list items to the Audit Log.</p:Description>
-      <p:CustomData>
-        <Audit>
-          <View/>
-        </Audit>
-      </p:CustomData>
-    </p:PolicyItem>
-  </p:PolicyItems>
-</p:Policy>
+<p:properties xmlns:p="http://schemas.microsoft.com/office/2006/metadata/properties" xmlns:xsi="http://www.w3.org/2001/XMLSchema-instance">
+  <documentManagement>
+    <_dlc_DocId xmlns="f2ad5090-61a8-4b8c-ab70-68f4ff4d1933">ARM-ECM-0559802</_dlc_DocId>
+    <_dlc_DocIdUrl xmlns="f2ad5090-61a8-4b8c-ab70-68f4ff4d1933">
+      <Url>http://teamsites.arm.com/sites/commops/_layouts/DocIdRedir.aspx?ID=ARM-ECM-0559802</Url>
+      <Description>ARM-ECM-0559802</Description>
+    </_dlc_DocIdUrl>
+  </documentManagement>
+</p:properties>
 </file>
 
 <file path=customXml/item5.xml><?xml version="1.0" encoding="utf-8"?>
 <?mso-contentType ?>
-<spe:Receivers xmlns:spe="http://schemas.microsoft.com/sharepoint/events">
-  <Receiver>
-    <Name>Document ID Generator</Name>
-    <Synchronization>Synchronous</Synchronization>
-    <Type>10001</Type>
-    <SequenceNumber>1000</SequenceNumber>
-    <Assembly>Microsoft.Office.DocumentManagement, Version=14.0.0.0, Culture=neutral, PublicKeyToken=71e9bce111e9429c</Assembly>
-    <Class>Microsoft.Office.DocumentManagement.Internal.DocIdHandler</Class>
-    <Data/>
-    <Filter/>
-  </Receiver>
-  <Receiver>
-    <Name>Document ID Generator</Name>
-    <Synchronization>Synchronous</Synchronization>
-    <Type>10002</Type>
-    <SequenceNumber>1001</SequenceNumber>
-    <Assembly>Microsoft.Office.DocumentManagement, Version=14.0.0.0, Culture=neutral, PublicKeyToken=71e9bce111e9429c</Assembly>
-    <Class>Microsoft.Office.DocumentManagement.Internal.DocIdHandler</Class>
-    <Data/>
-    <Filter/>
-  </Receiver>
-  <Receiver>
-    <Name>Document ID Generator</Name>
-    <Synchronization>Synchronous</Synchronization>
-    <Type>10004</Type>
-    <SequenceNumber>1002</SequenceNumber>
-    <Assembly>Microsoft.Office.DocumentManagement, Version=14.0.0.0, Culture=neutral, PublicKeyToken=71e9bce111e9429c</Assembly>
-    <Class>Microsoft.Office.DocumentManagement.Internal.DocIdHandler</Class>
-    <Data/>
-    <Filter/>
-  </Receiver>
-  <Receiver>
-    <Name>Document ID Generator</Name>
-    <Synchronization>Synchronous</Synchronization>
-    <Type>10006</Type>
-    <SequenceNumber>1003</SequenceNumber>
-    <Assembly>Microsoft.Office.DocumentManagement, Version=14.0.0.0, Culture=neutral, PublicKeyToken=71e9bce111e9429c</Assembly>
-    <Class>Microsoft.Office.DocumentManagement.Internal.DocIdHandler</Class>
-    <Data/>
-    <Filter/>
-  </Receiver>
-</spe:Receivers>
+<FormTemplates xmlns="http://schemas.microsoft.com/sharepoint/v3/contenttype/forms">
+  <Display>DocumentLibraryForm</Display>
+  <Edit>DocumentLibraryForm</Edit>
+  <New>DocumentLibraryForm</New>
+</FormTemplates>
 </file>
 
 <file path=customXml/itemProps1.xml><?xml version="1.0" encoding="utf-8"?>
-<ds:datastoreItem xmlns:ds="http://schemas.openxmlformats.org/officeDocument/2006/customXml" ds:itemID="{9C777C69-0744-4BF3-8514-FB149EBD2248}">
+<ds:datastoreItem xmlns:ds="http://schemas.openxmlformats.org/officeDocument/2006/customXml" ds:itemID="{6D3E6A18-9A0A-4E27-8E6B-E388B8915A7F}">
   <ds:schemaRefs>
-    <ds:schemaRef ds:uri="http://schemas.microsoft.com/sharepoint/v3/contenttype/forms"/>
+    <ds:schemaRef ds:uri="http://schemas.microsoft.com/sharepoint/events"/>
   </ds:schemaRefs>
 </ds:datastoreItem>
 </file>
 
 <file path=customXml/itemProps2.xml><?xml version="1.0" encoding="utf-8"?>
-<ds:datastoreItem xmlns:ds="http://schemas.openxmlformats.org/officeDocument/2006/customXml" ds:itemID="{AE6E82D6-7FB8-4D99-A7B6-3C5BB1D894B9}">
+<ds:datastoreItem xmlns:ds="http://schemas.openxmlformats.org/officeDocument/2006/customXml" ds:itemID="{2E15F6D0-803B-49DB-883D-8BBF7D0952E6}">
   <ds:schemaRefs>
-    <ds:schemaRef ds:uri="f2ad5090-61a8-4b8c-ab70-68f4ff4d1933"/>
-    <ds:schemaRef ds:uri="http://schemas.microsoft.com/sharepoint/v3"/>
-    <ds:schemaRef ds:uri="http://schemas.microsoft.com/office/2006/documentManagement/types"/>
-    <ds:schemaRef ds:uri="http://schemas.openxmlformats.org/package/2006/metadata/core-properties"/>
-    <ds:schemaRef ds:uri="http://purl.org/dc/dcmitype/"/>
-    <ds:schemaRef ds:uri="http://schemas.microsoft.com/office/infopath/2007/PartnerControls"/>
-    <ds:schemaRef ds:uri="http://purl.org/dc/elements/1.1/"/>
-    <ds:schemaRef ds:uri="http://schemas.microsoft.com/office/2006/metadata/properties"/>
-    <ds:schemaRef ds:uri="http://www.w3.org/XML/1998/namespace"/>
-    <ds:schemaRef ds:uri="http://purl.org/dc/terms/"/>
+    <ds:schemaRef ds:uri="office.server.policy"/>
   </ds:schemaRefs>
 </ds:datastoreItem>
 </file>
@@ -27882,17 +27693,26 @@
 </file>
 
 <file path=customXml/itemProps4.xml><?xml version="1.0" encoding="utf-8"?>
-<ds:datastoreItem xmlns:ds="http://schemas.openxmlformats.org/officeDocument/2006/customXml" ds:itemID="{2E15F6D0-803B-49DB-883D-8BBF7D0952E6}">
+<ds:datastoreItem xmlns:ds="http://schemas.openxmlformats.org/officeDocument/2006/customXml" ds:itemID="{AE6E82D6-7FB8-4D99-A7B6-3C5BB1D894B9}">
   <ds:schemaRefs>
-    <ds:schemaRef ds:uri="office.server.policy"/>
+    <ds:schemaRef ds:uri="f2ad5090-61a8-4b8c-ab70-68f4ff4d1933"/>
+    <ds:schemaRef ds:uri="http://schemas.microsoft.com/sharepoint/v3"/>
+    <ds:schemaRef ds:uri="http://schemas.microsoft.com/office/2006/documentManagement/types"/>
+    <ds:schemaRef ds:uri="http://schemas.openxmlformats.org/package/2006/metadata/core-properties"/>
+    <ds:schemaRef ds:uri="http://purl.org/dc/dcmitype/"/>
+    <ds:schemaRef ds:uri="http://schemas.microsoft.com/office/infopath/2007/PartnerControls"/>
+    <ds:schemaRef ds:uri="http://purl.org/dc/elements/1.1/"/>
+    <ds:schemaRef ds:uri="http://schemas.microsoft.com/office/2006/metadata/properties"/>
+    <ds:schemaRef ds:uri="http://www.w3.org/XML/1998/namespace"/>
+    <ds:schemaRef ds:uri="http://purl.org/dc/terms/"/>
   </ds:schemaRefs>
 </ds:datastoreItem>
 </file>
 
 <file path=customXml/itemProps5.xml><?xml version="1.0" encoding="utf-8"?>
-<ds:datastoreItem xmlns:ds="http://schemas.openxmlformats.org/officeDocument/2006/customXml" ds:itemID="{6D3E6A18-9A0A-4E27-8E6B-E388B8915A7F}">
+<ds:datastoreItem xmlns:ds="http://schemas.openxmlformats.org/officeDocument/2006/customXml" ds:itemID="{9C777C69-0744-4BF3-8514-FB149EBD2248}">
   <ds:schemaRefs>
-    <ds:schemaRef ds:uri="http://schemas.microsoft.com/sharepoint/events"/>
+    <ds:schemaRef ds:uri="http://schemas.microsoft.com/sharepoint/v3/contenttype/forms"/>
   </ds:schemaRefs>
 </ds:datastoreItem>
 </file>
</xml_diff>